<commit_message>
Added new presentation templates.
</commit_message>
<xml_diff>
--- a/bot/ai_generator/presentation_templates/Organic.pptx
+++ b/bot/ai_generator/presentation_templates/Organic.pptx
@@ -252,7 +252,7 @@
           <a:p>
             <a:fld id="{FD913024-4032-4B4F-8680-09D5E08EDB6E}" type="datetimeFigureOut">
               <a:rPr lang="en-US" smtClean="0"/>
-              <a:t>4/11/2023</a:t>
+              <a:t>4/12/2023</a:t>
             </a:fld>
             <a:endParaRPr lang="en-US" dirty="0"/>
           </a:p>
@@ -429,7 +429,7 @@
           <a:p>
             <a:fld id="{F2AE225E-43E0-7047-8ADB-DD9EBB41B4D0}" type="datetimeFigureOut">
               <a:rPr lang="en-US" noProof="0" smtClean="0"/>
-              <a:t>4/11/2023</a:t>
+              <a:t>4/12/2023</a:t>
             </a:fld>
             <a:endParaRPr lang="en-US" noProof="0" dirty="0"/>
           </a:p>
@@ -38940,7 +38940,7 @@
         </p:nvSpPr>
         <p:spPr>
           <a:xfrm>
-            <a:off x="576071" y="704088"/>
+            <a:off x="576071" y="690101"/>
             <a:ext cx="6502620" cy="676656"/>
           </a:xfrm>
         </p:spPr>
@@ -38977,7 +38977,7 @@
         </p:nvSpPr>
         <p:spPr>
           <a:xfrm>
-            <a:off x="576072" y="1947671"/>
+            <a:off x="576071" y="1693658"/>
             <a:ext cx="4572000" cy="4070729"/>
           </a:xfrm>
         </p:spPr>
@@ -38994,7 +38994,7 @@
                 <a:spcPts val="0"/>
               </a:spcBef>
               <a:buNone/>
-              <a:defRPr sz="1800"/>
+              <a:defRPr sz="2400"/>
             </a:lvl1pPr>
             <a:lvl2pPr marL="457200" indent="0">
               <a:buNone/>
@@ -39032,7 +39032,7 @@
           <a:p>
             <a:pPr lvl="0"/>
             <a:r>
-              <a:rPr lang="en-US"/>
+              <a:rPr lang="en-US" dirty="0"/>
               <a:t>Click to edit Master text styles</a:t>
             </a:r>
           </a:p>

</xml_diff>

<commit_message>
Updated prompts for generating works. Updated East Asia, Mountains and Organic pptx templates. Updated text in count slides callback message. Updated list of blocked sites.
</commit_message>
<xml_diff>
--- a/bot/ai_generator/presentation_templates/Organic.pptx
+++ b/bot/ai_generator/presentation_templates/Organic.pptx
@@ -252,7 +252,7 @@
           <a:p>
             <a:fld id="{FD913024-4032-4B4F-8680-09D5E08EDB6E}" type="datetimeFigureOut">
               <a:rPr lang="en-US" smtClean="0"/>
-              <a:t>5/1/2023</a:t>
+              <a:t>5/3/2023</a:t>
             </a:fld>
             <a:endParaRPr lang="en-US" dirty="0"/>
           </a:p>
@@ -429,7 +429,7 @@
           <a:p>
             <a:fld id="{F2AE225E-43E0-7047-8ADB-DD9EBB41B4D0}" type="datetimeFigureOut">
               <a:rPr lang="en-US" noProof="0" smtClean="0"/>
-              <a:t>5/1/2023</a:t>
+              <a:t>5/3/2023</a:t>
             </a:fld>
             <a:endParaRPr lang="en-US" noProof="0" dirty="0"/>
           </a:p>
@@ -23339,8 +23339,8 @@
         </p:nvSpPr>
         <p:spPr>
           <a:xfrm>
-            <a:off x="576072" y="704088"/>
-            <a:ext cx="10515600" cy="676656"/>
+            <a:off x="1215136" y="665988"/>
+            <a:ext cx="9761728" cy="1197864"/>
           </a:xfrm>
         </p:spPr>
         <p:txBody>
@@ -23373,13 +23373,20 @@
         </p:nvSpPr>
         <p:spPr>
           <a:xfrm>
-            <a:off x="576072" y="1901952"/>
-            <a:ext cx="9363456" cy="3877056"/>
+            <a:off x="1215136" y="1863852"/>
+            <a:ext cx="9761728" cy="3877056"/>
           </a:xfrm>
         </p:spPr>
         <p:txBody>
-          <a:bodyPr/>
-          <a:lstStyle/>
+          <a:bodyPr>
+            <a:normAutofit/>
+          </a:bodyPr>
+          <a:lstStyle>
+            <a:lvl1pPr marL="0" indent="0">
+              <a:buNone/>
+              <a:defRPr sz="2400"/>
+            </a:lvl1pPr>
+          </a:lstStyle>
           <a:p>
             <a:pPr lvl="0"/>
             <a:endParaRPr lang="en-US" dirty="0"/>
@@ -23537,6 +23544,134 @@
       </p:grpSpPr>
       <p:sp>
         <p:nvSpPr>
+          <p:cNvPr id="13" name="Freeform: Shape 12">
+            <a:extLst>
+              <a:ext uri="{FF2B5EF4-FFF2-40B4-BE49-F238E27FC236}">
+                <a16:creationId xmlns:a16="http://schemas.microsoft.com/office/drawing/2014/main" id="{B560DF2B-C95A-F8F1-E64F-37BCABFF8014}"/>
+              </a:ext>
+            </a:extLst>
+          </p:cNvPr>
+          <p:cNvSpPr/>
+          <p:nvPr userDrawn="1"/>
+        </p:nvSpPr>
+        <p:spPr>
+          <a:xfrm>
+            <a:off x="5790280" y="0"/>
+            <a:ext cx="6401718" cy="6857999"/>
+          </a:xfrm>
+          <a:custGeom>
+            <a:avLst/>
+            <a:gdLst>
+              <a:gd name="connsiteX0" fmla="*/ 13164 w 6401718"/>
+              <a:gd name="connsiteY0" fmla="*/ 0 h 6857999"/>
+              <a:gd name="connsiteX1" fmla="*/ 6401718 w 6401718"/>
+              <a:gd name="connsiteY1" fmla="*/ 0 h 6857999"/>
+              <a:gd name="connsiteX2" fmla="*/ 6401718 w 6401718"/>
+              <a:gd name="connsiteY2" fmla="*/ 6857999 h 6857999"/>
+              <a:gd name="connsiteX3" fmla="*/ 4837168 w 6401718"/>
+              <a:gd name="connsiteY3" fmla="*/ 6857999 h 6857999"/>
+              <a:gd name="connsiteX4" fmla="*/ 4970284 w 6401718"/>
+              <a:gd name="connsiteY4" fmla="*/ 6566499 h 6857999"/>
+              <a:gd name="connsiteX5" fmla="*/ 5441996 w 6401718"/>
+              <a:gd name="connsiteY5" fmla="*/ 3607583 h 6857999"/>
+              <a:gd name="connsiteX6" fmla="*/ 333189 w 6401718"/>
+              <a:gd name="connsiteY6" fmla="*/ 1342399 h 6857999"/>
+              <a:gd name="connsiteX7" fmla="*/ 10627 w 6401718"/>
+              <a:gd name="connsiteY7" fmla="*/ 17156 h 6857999"/>
+            </a:gdLst>
+            <a:ahLst/>
+            <a:cxnLst>
+              <a:cxn ang="0">
+                <a:pos x="connsiteX0" y="connsiteY0"/>
+              </a:cxn>
+              <a:cxn ang="0">
+                <a:pos x="connsiteX1" y="connsiteY1"/>
+              </a:cxn>
+              <a:cxn ang="0">
+                <a:pos x="connsiteX2" y="connsiteY2"/>
+              </a:cxn>
+              <a:cxn ang="0">
+                <a:pos x="connsiteX3" y="connsiteY3"/>
+              </a:cxn>
+              <a:cxn ang="0">
+                <a:pos x="connsiteX4" y="connsiteY4"/>
+              </a:cxn>
+              <a:cxn ang="0">
+                <a:pos x="connsiteX5" y="connsiteY5"/>
+              </a:cxn>
+              <a:cxn ang="0">
+                <a:pos x="connsiteX6" y="connsiteY6"/>
+              </a:cxn>
+              <a:cxn ang="0">
+                <a:pos x="connsiteX7" y="connsiteY7"/>
+              </a:cxn>
+            </a:cxnLst>
+            <a:rect l="l" t="t" r="r" b="b"/>
+            <a:pathLst>
+              <a:path w="6401718" h="6857999">
+                <a:moveTo>
+                  <a:pt x="13164" y="0"/>
+                </a:moveTo>
+                <a:lnTo>
+                  <a:pt x="6401718" y="0"/>
+                </a:lnTo>
+                <a:lnTo>
+                  <a:pt x="6401718" y="6857999"/>
+                </a:lnTo>
+                <a:lnTo>
+                  <a:pt x="4837168" y="6857999"/>
+                </a:lnTo>
+                <a:lnTo>
+                  <a:pt x="4970284" y="6566499"/>
+                </a:lnTo>
+                <a:cubicBezTo>
+                  <a:pt x="5459272" y="5503700"/>
+                  <a:pt x="5952697" y="4415857"/>
+                  <a:pt x="5441996" y="3607583"/>
+                </a:cubicBezTo>
+                <a:cubicBezTo>
+                  <a:pt x="4534017" y="2170575"/>
+                  <a:pt x="1476973" y="3238952"/>
+                  <a:pt x="333189" y="1342399"/>
+                </a:cubicBezTo>
+                <a:cubicBezTo>
+                  <a:pt x="249159" y="1202652"/>
+                  <a:pt x="-60917" y="673160"/>
+                  <a:pt x="10627" y="17156"/>
+                </a:cubicBezTo>
+                <a:close/>
+              </a:path>
+            </a:pathLst>
+          </a:custGeom>
+          <a:solidFill>
+            <a:schemeClr val="accent4"/>
+          </a:solidFill>
+          <a:ln w="4525" cap="flat">
+            <a:noFill/>
+            <a:prstDash val="solid"/>
+            <a:miter/>
+          </a:ln>
+        </p:spPr>
+        <p:txBody>
+          <a:bodyPr rot="0" spcFirstLastPara="0" vertOverflow="overflow" horzOverflow="overflow" vert="horz" wrap="square" lIns="91440" tIns="45720" rIns="91440" bIns="45720" numCol="1" spcCol="0" rtlCol="0" fromWordArt="0" anchor="ctr" anchorCtr="0" forceAA="0" compatLnSpc="1">
+            <a:prstTxWarp prst="textNoShape">
+              <a:avLst/>
+            </a:prstTxWarp>
+            <a:noAutofit/>
+          </a:bodyPr>
+          <a:lstStyle/>
+          <a:p>
+            <a:pPr lvl="0"/>
+            <a:endParaRPr lang="en-US" dirty="0">
+              <a:solidFill>
+                <a:schemeClr val="tx1"/>
+              </a:solidFill>
+            </a:endParaRPr>
+          </a:p>
+        </p:txBody>
+      </p:sp>
+      <p:sp>
+        <p:nvSpPr>
           <p:cNvPr id="25" name="Freeform: Shape 24">
             <a:extLst>
               <a:ext uri="{FF2B5EF4-FFF2-40B4-BE49-F238E27FC236}">
@@ -23684,8 +23819,8 @@
         </p:nvSpPr>
         <p:spPr>
           <a:xfrm>
-            <a:off x="2560320" y="3078480"/>
-            <a:ext cx="4840641" cy="1773555"/>
+            <a:off x="2560320" y="2416941"/>
+            <a:ext cx="7071360" cy="2439035"/>
           </a:xfrm>
         </p:spPr>
         <p:txBody>
@@ -23722,8 +23857,8 @@
         </p:nvSpPr>
         <p:spPr>
           <a:xfrm>
-            <a:off x="2560320" y="4852035"/>
-            <a:ext cx="4840641" cy="551411"/>
+            <a:off x="2567800" y="4883381"/>
+            <a:ext cx="7071360" cy="551411"/>
           </a:xfrm>
         </p:spPr>
         <p:txBody>
@@ -26069,134 +26204,6 @@
             </a:schemeClr>
           </a:solidFill>
           <a:ln w="52715" cap="flat">
-            <a:noFill/>
-            <a:prstDash val="solid"/>
-            <a:miter/>
-          </a:ln>
-        </p:spPr>
-        <p:txBody>
-          <a:bodyPr rot="0" spcFirstLastPara="0" vertOverflow="overflow" horzOverflow="overflow" vert="horz" wrap="square" lIns="91440" tIns="45720" rIns="91440" bIns="45720" numCol="1" spcCol="0" rtlCol="0" fromWordArt="0" anchor="ctr" anchorCtr="0" forceAA="0" compatLnSpc="1">
-            <a:prstTxWarp prst="textNoShape">
-              <a:avLst/>
-            </a:prstTxWarp>
-            <a:noAutofit/>
-          </a:bodyPr>
-          <a:lstStyle/>
-          <a:p>
-            <a:pPr lvl="0"/>
-            <a:endParaRPr lang="en-US" dirty="0">
-              <a:solidFill>
-                <a:schemeClr val="tx1"/>
-              </a:solidFill>
-            </a:endParaRPr>
-          </a:p>
-        </p:txBody>
-      </p:sp>
-      <p:sp>
-        <p:nvSpPr>
-          <p:cNvPr id="13" name="Freeform: Shape 12">
-            <a:extLst>
-              <a:ext uri="{FF2B5EF4-FFF2-40B4-BE49-F238E27FC236}">
-                <a16:creationId xmlns:a16="http://schemas.microsoft.com/office/drawing/2014/main" id="{B560DF2B-C95A-F8F1-E64F-37BCABFF8014}"/>
-              </a:ext>
-            </a:extLst>
-          </p:cNvPr>
-          <p:cNvSpPr/>
-          <p:nvPr userDrawn="1"/>
-        </p:nvSpPr>
-        <p:spPr>
-          <a:xfrm>
-            <a:off x="5790280" y="0"/>
-            <a:ext cx="6401718" cy="6857999"/>
-          </a:xfrm>
-          <a:custGeom>
-            <a:avLst/>
-            <a:gdLst>
-              <a:gd name="connsiteX0" fmla="*/ 13164 w 6401718"/>
-              <a:gd name="connsiteY0" fmla="*/ 0 h 6857999"/>
-              <a:gd name="connsiteX1" fmla="*/ 6401718 w 6401718"/>
-              <a:gd name="connsiteY1" fmla="*/ 0 h 6857999"/>
-              <a:gd name="connsiteX2" fmla="*/ 6401718 w 6401718"/>
-              <a:gd name="connsiteY2" fmla="*/ 6857999 h 6857999"/>
-              <a:gd name="connsiteX3" fmla="*/ 4837168 w 6401718"/>
-              <a:gd name="connsiteY3" fmla="*/ 6857999 h 6857999"/>
-              <a:gd name="connsiteX4" fmla="*/ 4970284 w 6401718"/>
-              <a:gd name="connsiteY4" fmla="*/ 6566499 h 6857999"/>
-              <a:gd name="connsiteX5" fmla="*/ 5441996 w 6401718"/>
-              <a:gd name="connsiteY5" fmla="*/ 3607583 h 6857999"/>
-              <a:gd name="connsiteX6" fmla="*/ 333189 w 6401718"/>
-              <a:gd name="connsiteY6" fmla="*/ 1342399 h 6857999"/>
-              <a:gd name="connsiteX7" fmla="*/ 10627 w 6401718"/>
-              <a:gd name="connsiteY7" fmla="*/ 17156 h 6857999"/>
-            </a:gdLst>
-            <a:ahLst/>
-            <a:cxnLst>
-              <a:cxn ang="0">
-                <a:pos x="connsiteX0" y="connsiteY0"/>
-              </a:cxn>
-              <a:cxn ang="0">
-                <a:pos x="connsiteX1" y="connsiteY1"/>
-              </a:cxn>
-              <a:cxn ang="0">
-                <a:pos x="connsiteX2" y="connsiteY2"/>
-              </a:cxn>
-              <a:cxn ang="0">
-                <a:pos x="connsiteX3" y="connsiteY3"/>
-              </a:cxn>
-              <a:cxn ang="0">
-                <a:pos x="connsiteX4" y="connsiteY4"/>
-              </a:cxn>
-              <a:cxn ang="0">
-                <a:pos x="connsiteX5" y="connsiteY5"/>
-              </a:cxn>
-              <a:cxn ang="0">
-                <a:pos x="connsiteX6" y="connsiteY6"/>
-              </a:cxn>
-              <a:cxn ang="0">
-                <a:pos x="connsiteX7" y="connsiteY7"/>
-              </a:cxn>
-            </a:cxnLst>
-            <a:rect l="l" t="t" r="r" b="b"/>
-            <a:pathLst>
-              <a:path w="6401718" h="6857999">
-                <a:moveTo>
-                  <a:pt x="13164" y="0"/>
-                </a:moveTo>
-                <a:lnTo>
-                  <a:pt x="6401718" y="0"/>
-                </a:lnTo>
-                <a:lnTo>
-                  <a:pt x="6401718" y="6857999"/>
-                </a:lnTo>
-                <a:lnTo>
-                  <a:pt x="4837168" y="6857999"/>
-                </a:lnTo>
-                <a:lnTo>
-                  <a:pt x="4970284" y="6566499"/>
-                </a:lnTo>
-                <a:cubicBezTo>
-                  <a:pt x="5459272" y="5503700"/>
-                  <a:pt x="5952697" y="4415857"/>
-                  <a:pt x="5441996" y="3607583"/>
-                </a:cubicBezTo>
-                <a:cubicBezTo>
-                  <a:pt x="4534017" y="2170575"/>
-                  <a:pt x="1476973" y="3238952"/>
-                  <a:pt x="333189" y="1342399"/>
-                </a:cubicBezTo>
-                <a:cubicBezTo>
-                  <a:pt x="249159" y="1202652"/>
-                  <a:pt x="-60917" y="673160"/>
-                  <a:pt x="10627" y="17156"/>
-                </a:cubicBezTo>
-                <a:close/>
-              </a:path>
-            </a:pathLst>
-          </a:custGeom>
-          <a:solidFill>
-            <a:schemeClr val="accent4"/>
-          </a:solidFill>
-          <a:ln w="4525" cap="flat">
             <a:noFill/>
             <a:prstDash val="solid"/>
             <a:miter/>
@@ -39385,7 +39392,7 @@
             <a:normAutofit/>
           </a:bodyPr>
           <a:lstStyle>
-            <a:lvl1pPr marL="342900" indent="-342900">
+            <a:lvl1pPr marL="0" indent="0">
               <a:lnSpc>
                 <a:spcPct val="100000"/>
               </a:lnSpc>
@@ -39393,7 +39400,7 @@
                 <a:spcPts val="0"/>
               </a:spcBef>
               <a:buFont typeface="Arial" panose="020B0604020202020204" pitchFamily="34" charset="0"/>
-              <a:buChar char="•"/>
+              <a:buNone/>
               <a:defRPr sz="2400"/>
             </a:lvl1pPr>
             <a:lvl2pPr marL="457200" indent="0">
@@ -40496,7 +40503,7 @@
           <a:bodyPr/>
           <a:lstStyle/>
           <a:p>
-            <a:endParaRPr lang="ru-UA"/>
+            <a:endParaRPr lang="ru-UA" dirty="0"/>
           </a:p>
         </p:txBody>
       </p:sp>

</xml_diff>